<commit_message>
Add bpmn AS IS no ptt e pasta diagramas
</commit_message>
<xml_diff>
--- a/Sprint1/Apresentacoes/PI_Contexto.pptx
+++ b/Sprint1/Apresentacoes/PI_Contexto.pptx
@@ -6990,7 +6990,7 @@
               <a:t>Sistema atual favorece atuação </a:t>
             </a:r>
             <a:r>
-              <a:rPr lang="" altLang="pt-BR" sz="2400" dirty="0">
+              <a:rPr lang="en-US" altLang="pt-BR" sz="2400" dirty="0">
                 <a:latin typeface="Lato" panose="020B0502040204020203" pitchFamily="34" charset="0"/>
               </a:rPr>
               <a:t>de </a:t>
@@ -7043,42 +7043,6 @@
           <a:chExt cx="0" cy="0"/>
         </a:xfrm>
       </p:grpSpPr>
-      <p:sp>
-        <p:nvSpPr>
-          <p:cNvPr id="7" name="CustomShape 2"/>
-          <p:cNvSpPr/>
-          <p:nvPr/>
-        </p:nvSpPr>
-        <p:spPr>
-          <a:xfrm>
-            <a:off x="0" y="11357810"/>
-            <a:ext cx="12192000" cy="2357829"/>
-          </a:xfrm>
-          <a:prstGeom prst="rect">
-            <a:avLst/>
-          </a:prstGeom>
-          <a:solidFill>
-            <a:schemeClr val="accent1"/>
-          </a:solidFill>
-          <a:ln>
-            <a:noFill/>
-          </a:ln>
-        </p:spPr>
-        <p:style>
-          <a:lnRef idx="2">
-            <a:schemeClr val="accent1">
-              <a:shade val="50000"/>
-            </a:schemeClr>
-          </a:lnRef>
-          <a:fillRef idx="1">
-            <a:schemeClr val="accent1"/>
-          </a:fillRef>
-          <a:effectRef idx="0">
-            <a:schemeClr val="accent1"/>
-          </a:effectRef>
-          <a:fontRef idx="minor"/>
-        </p:style>
-      </p:sp>
       <p:pic>
         <p:nvPicPr>
           <p:cNvPr id="6" name="Imagem 5" descr="Uma imagem contendo quarto&#10;&#10;Descrição gerada automaticamente"/>
@@ -7296,36 +7260,30 @@
           <a:fontRef idx="minor"/>
         </p:style>
       </p:sp>
-      <p:sp>
-        <p:nvSpPr>
-          <p:cNvPr id="2" name="CaixaDeTexto 1"/>
-          <p:cNvSpPr txBox="1"/>
+      <p:pic>
+        <p:nvPicPr>
+          <p:cNvPr id="4" name="Picture 3" descr="bpmn - pi"/>
+          <p:cNvPicPr>
+            <a:picLocks noChangeAspect="1"/>
+          </p:cNvPicPr>
           <p:nvPr/>
-        </p:nvSpPr>
-        <p:spPr>
-          <a:xfrm>
-            <a:off x="1323832" y="1555845"/>
-            <a:ext cx="3111689" cy="369332"/>
+        </p:nvPicPr>
+        <p:blipFill>
+          <a:blip r:embed="rId2"/>
+          <a:stretch>
+            <a:fillRect/>
+          </a:stretch>
+        </p:blipFill>
+        <p:spPr>
+          <a:xfrm>
+            <a:off x="1282700" y="1578610"/>
+            <a:ext cx="10058400" cy="3701415"/>
           </a:xfrm>
           <a:prstGeom prst="rect">
             <a:avLst/>
           </a:prstGeom>
-          <a:noFill/>
-        </p:spPr>
-        <p:txBody>
-          <a:bodyPr wrap="square" rtlCol="0">
-            <a:spAutoFit/>
-          </a:bodyPr>
-          <a:lstStyle/>
-          <a:p>
-            <a:r>
-              <a:rPr lang="pt-BR" dirty="0"/>
-              <a:t>Aqui vai um Diagrama ou HLD</a:t>
-            </a:r>
-            <a:endParaRPr lang="pt-BR" dirty="0"/>
-          </a:p>
-        </p:txBody>
-      </p:sp>
+        </p:spPr>
+      </p:pic>
     </p:spTree>
   </p:cSld>
   <p:clrMapOvr>

</xml_diff>

<commit_message>
Removi forma preta dos slides 6 e 8 do PPT  e Adicionei Processo.bpm à documentaçao
</commit_message>
<xml_diff>
--- a/Sprint1/Apresentacoes/PI_Contexto.pptx
+++ b/Sprint1/Apresentacoes/PI_Contexto.pptx
@@ -3,20 +3,20 @@
 <p:presentation xmlns:a="http://schemas.openxmlformats.org/drawingml/2006/main" xmlns:r="http://schemas.openxmlformats.org/officeDocument/2006/relationships" xmlns:p="http://schemas.openxmlformats.org/presentationml/2006/main">
   <p:sldMasterIdLst>
     <p:sldMasterId id="2147483648" r:id="rId1"/>
-    <p:sldMasterId id="2147483661" r:id="rId3"/>
+    <p:sldMasterId id="2147483661" r:id="rId2"/>
   </p:sldMasterIdLst>
   <p:sldIdLst>
-    <p:sldId id="256" r:id="rId4"/>
-    <p:sldId id="257" r:id="rId5"/>
-    <p:sldId id="258" r:id="rId6"/>
-    <p:sldId id="259" r:id="rId7"/>
-    <p:sldId id="260" r:id="rId8"/>
-    <p:sldId id="261" r:id="rId9"/>
-    <p:sldId id="262" r:id="rId10"/>
-    <p:sldId id="263" r:id="rId11"/>
+    <p:sldId id="256" r:id="rId3"/>
+    <p:sldId id="257" r:id="rId4"/>
+    <p:sldId id="258" r:id="rId5"/>
+    <p:sldId id="259" r:id="rId6"/>
+    <p:sldId id="260" r:id="rId7"/>
+    <p:sldId id="261" r:id="rId8"/>
+    <p:sldId id="262" r:id="rId9"/>
+    <p:sldId id="263" r:id="rId10"/>
   </p:sldIdLst>
   <p:sldSz cx="12192000" cy="6858000"/>
-  <p:notesSz cx="7559675" cy="10691495"/>
+  <p:notesSz cx="7559675" cy="10691813"/>
   <p:defaultTextStyle>
     <a:lvl1pPr marL="0" algn="l" defTabSz="914400" rtl="0" eaLnBrk="1" latinLnBrk="0" hangingPunct="1">
       <a:defRPr sz="1800" kern="1200">
@@ -175,6 +175,7 @@
         </p:spPr>
         <p:txBody>
           <a:bodyPr lIns="0" tIns="0" rIns="0" bIns="0" anchor="ctr"/>
+          <a:lstStyle/>
           <a:p>
             <a:endParaRPr lang="pt-BR" sz="1800" b="0" strike="noStrike" spc="-1">
               <a:solidFill>
@@ -208,6 +209,7 @@
           <a:bodyPr lIns="0" tIns="0" rIns="0" bIns="0">
             <a:normAutofit/>
           </a:bodyPr>
+          <a:lstStyle/>
           <a:p>
             <a:endParaRPr lang="pt-BR" sz="2800" b="0" strike="noStrike" spc="-1">
               <a:solidFill>
@@ -241,6 +243,7 @@
           <a:bodyPr lIns="0" tIns="0" rIns="0" bIns="0">
             <a:normAutofit/>
           </a:bodyPr>
+          <a:lstStyle/>
           <a:p>
             <a:endParaRPr lang="pt-BR" sz="2800" b="0" strike="noStrike" spc="-1">
               <a:solidFill>
@@ -297,6 +300,7 @@
         </p:spPr>
         <p:txBody>
           <a:bodyPr lIns="0" tIns="0" rIns="0" bIns="0" anchor="ctr"/>
+          <a:lstStyle/>
           <a:p>
             <a:endParaRPr lang="pt-BR" sz="1800" b="0" strike="noStrike" spc="-1">
               <a:solidFill>
@@ -330,6 +334,7 @@
           <a:bodyPr lIns="0" tIns="0" rIns="0" bIns="0">
             <a:normAutofit/>
           </a:bodyPr>
+          <a:lstStyle/>
           <a:p>
             <a:endParaRPr lang="pt-BR" sz="2800" b="0" strike="noStrike" spc="-1">
               <a:solidFill>
@@ -363,6 +368,7 @@
           <a:bodyPr lIns="0" tIns="0" rIns="0" bIns="0">
             <a:normAutofit/>
           </a:bodyPr>
+          <a:lstStyle/>
           <a:p>
             <a:endParaRPr lang="pt-BR" sz="2800" b="0" strike="noStrike" spc="-1">
               <a:solidFill>
@@ -396,6 +402,7 @@
           <a:bodyPr lIns="0" tIns="0" rIns="0" bIns="0">
             <a:normAutofit/>
           </a:bodyPr>
+          <a:lstStyle/>
           <a:p>
             <a:endParaRPr lang="pt-BR" sz="2800" b="0" strike="noStrike" spc="-1">
               <a:solidFill>
@@ -429,6 +436,7 @@
           <a:bodyPr lIns="0" tIns="0" rIns="0" bIns="0">
             <a:normAutofit/>
           </a:bodyPr>
+          <a:lstStyle/>
           <a:p>
             <a:endParaRPr lang="pt-BR" sz="2800" b="0" strike="noStrike" spc="-1">
               <a:solidFill>
@@ -485,6 +493,7 @@
         </p:spPr>
         <p:txBody>
           <a:bodyPr lIns="0" tIns="0" rIns="0" bIns="0" anchor="ctr"/>
+          <a:lstStyle/>
           <a:p>
             <a:endParaRPr lang="pt-BR" sz="1800" b="0" strike="noStrike" spc="-1">
               <a:solidFill>
@@ -518,6 +527,7 @@
           <a:bodyPr lIns="0" tIns="0" rIns="0" bIns="0">
             <a:normAutofit/>
           </a:bodyPr>
+          <a:lstStyle/>
           <a:p>
             <a:endParaRPr lang="pt-BR" sz="2800" b="0" strike="noStrike" spc="-1">
               <a:solidFill>
@@ -551,6 +561,7 @@
           <a:bodyPr lIns="0" tIns="0" rIns="0" bIns="0">
             <a:normAutofit/>
           </a:bodyPr>
+          <a:lstStyle/>
           <a:p>
             <a:endParaRPr lang="pt-BR" sz="2800" b="0" strike="noStrike" spc="-1">
               <a:solidFill>
@@ -584,6 +595,7 @@
           <a:bodyPr lIns="0" tIns="0" rIns="0" bIns="0">
             <a:normAutofit/>
           </a:bodyPr>
+          <a:lstStyle/>
           <a:p>
             <a:endParaRPr lang="pt-BR" sz="2800" b="0" strike="noStrike" spc="-1">
               <a:solidFill>
@@ -617,6 +629,7 @@
           <a:bodyPr lIns="0" tIns="0" rIns="0" bIns="0">
             <a:normAutofit/>
           </a:bodyPr>
+          <a:lstStyle/>
           <a:p>
             <a:endParaRPr lang="pt-BR" sz="2800" b="0" strike="noStrike" spc="-1">
               <a:solidFill>
@@ -650,6 +663,7 @@
           <a:bodyPr lIns="0" tIns="0" rIns="0" bIns="0">
             <a:normAutofit/>
           </a:bodyPr>
+          <a:lstStyle/>
           <a:p>
             <a:endParaRPr lang="pt-BR" sz="2800" b="0" strike="noStrike" spc="-1">
               <a:solidFill>
@@ -683,6 +697,7 @@
           <a:bodyPr lIns="0" tIns="0" rIns="0" bIns="0">
             <a:normAutofit/>
           </a:bodyPr>
+          <a:lstStyle/>
           <a:p>
             <a:endParaRPr lang="pt-BR" sz="2800" b="0" strike="noStrike" spc="-1">
               <a:solidFill>
@@ -764,6 +779,7 @@
         </p:spPr>
         <p:txBody>
           <a:bodyPr lIns="0" tIns="0" rIns="0" bIns="0" anchor="ctr"/>
+          <a:lstStyle/>
           <a:p>
             <a:endParaRPr lang="pt-BR" sz="1800" b="0" strike="noStrike" spc="-1">
               <a:solidFill>
@@ -795,6 +811,7 @@
         </p:spPr>
         <p:txBody>
           <a:bodyPr lIns="0" tIns="0" rIns="0" bIns="0" anchor="ctr"/>
+          <a:lstStyle/>
           <a:p>
             <a:pPr algn="ctr"/>
             <a:endParaRPr lang="pt-BR" sz="3200" b="0" strike="noStrike" spc="-1">
@@ -849,6 +866,7 @@
         </p:spPr>
         <p:txBody>
           <a:bodyPr lIns="0" tIns="0" rIns="0" bIns="0" anchor="ctr"/>
+          <a:lstStyle/>
           <a:p>
             <a:endParaRPr lang="pt-BR" sz="1800" b="0" strike="noStrike" spc="-1">
               <a:solidFill>
@@ -882,6 +900,7 @@
           <a:bodyPr lIns="0" tIns="0" rIns="0" bIns="0">
             <a:normAutofit/>
           </a:bodyPr>
+          <a:lstStyle/>
           <a:p>
             <a:endParaRPr lang="pt-BR" sz="2800" b="0" strike="noStrike" spc="-1">
               <a:solidFill>
@@ -938,6 +957,7 @@
         </p:spPr>
         <p:txBody>
           <a:bodyPr lIns="0" tIns="0" rIns="0" bIns="0" anchor="ctr"/>
+          <a:lstStyle/>
           <a:p>
             <a:endParaRPr lang="pt-BR" sz="1800" b="0" strike="noStrike" spc="-1">
               <a:solidFill>
@@ -971,6 +991,7 @@
           <a:bodyPr lIns="0" tIns="0" rIns="0" bIns="0">
             <a:normAutofit/>
           </a:bodyPr>
+          <a:lstStyle/>
           <a:p>
             <a:endParaRPr lang="pt-BR" sz="2800" b="0" strike="noStrike" spc="-1">
               <a:solidFill>
@@ -1004,6 +1025,7 @@
           <a:bodyPr lIns="0" tIns="0" rIns="0" bIns="0">
             <a:normAutofit/>
           </a:bodyPr>
+          <a:lstStyle/>
           <a:p>
             <a:endParaRPr lang="pt-BR" sz="2800" b="0" strike="noStrike" spc="-1">
               <a:solidFill>
@@ -1060,6 +1082,7 @@
         </p:spPr>
         <p:txBody>
           <a:bodyPr lIns="0" tIns="0" rIns="0" bIns="0" anchor="ctr"/>
+          <a:lstStyle/>
           <a:p>
             <a:endParaRPr lang="pt-BR" sz="1800" b="0" strike="noStrike" spc="-1">
               <a:solidFill>
@@ -1116,6 +1139,7 @@
         </p:spPr>
         <p:txBody>
           <a:bodyPr lIns="0" tIns="0" rIns="0" bIns="0" anchor="ctr"/>
+          <a:lstStyle/>
           <a:p>
             <a:pPr algn="ctr"/>
             <a:endParaRPr lang="pt-BR" sz="3200" b="0" strike="noStrike" spc="-1">
@@ -1170,6 +1194,7 @@
         </p:spPr>
         <p:txBody>
           <a:bodyPr lIns="0" tIns="0" rIns="0" bIns="0" anchor="ctr"/>
+          <a:lstStyle/>
           <a:p>
             <a:endParaRPr lang="pt-BR" sz="1800" b="0" strike="noStrike" spc="-1">
               <a:solidFill>
@@ -1203,6 +1228,7 @@
           <a:bodyPr lIns="0" tIns="0" rIns="0" bIns="0">
             <a:normAutofit/>
           </a:bodyPr>
+          <a:lstStyle/>
           <a:p>
             <a:endParaRPr lang="pt-BR" sz="2800" b="0" strike="noStrike" spc="-1">
               <a:solidFill>
@@ -1236,6 +1262,7 @@
           <a:bodyPr lIns="0" tIns="0" rIns="0" bIns="0">
             <a:normAutofit/>
           </a:bodyPr>
+          <a:lstStyle/>
           <a:p>
             <a:endParaRPr lang="pt-BR" sz="2800" b="0" strike="noStrike" spc="-1">
               <a:solidFill>
@@ -1269,6 +1296,7 @@
           <a:bodyPr lIns="0" tIns="0" rIns="0" bIns="0">
             <a:normAutofit/>
           </a:bodyPr>
+          <a:lstStyle/>
           <a:p>
             <a:endParaRPr lang="pt-BR" sz="2800" b="0" strike="noStrike" spc="-1">
               <a:solidFill>
@@ -1325,6 +1353,7 @@
         </p:spPr>
         <p:txBody>
           <a:bodyPr lIns="0" tIns="0" rIns="0" bIns="0" anchor="ctr"/>
+          <a:lstStyle/>
           <a:p>
             <a:endParaRPr lang="pt-BR" sz="1800" b="0" strike="noStrike" spc="-1">
               <a:solidFill>
@@ -1356,6 +1385,7 @@
         </p:spPr>
         <p:txBody>
           <a:bodyPr lIns="0" tIns="0" rIns="0" bIns="0" anchor="ctr"/>
+          <a:lstStyle/>
           <a:p>
             <a:pPr algn="ctr"/>
             <a:endParaRPr lang="pt-BR" sz="3200" b="0" strike="noStrike" spc="-1">
@@ -1410,6 +1440,7 @@
         </p:spPr>
         <p:txBody>
           <a:bodyPr lIns="0" tIns="0" rIns="0" bIns="0" anchor="ctr"/>
+          <a:lstStyle/>
           <a:p>
             <a:endParaRPr lang="pt-BR" sz="1800" b="0" strike="noStrike" spc="-1">
               <a:solidFill>
@@ -1443,6 +1474,7 @@
           <a:bodyPr lIns="0" tIns="0" rIns="0" bIns="0">
             <a:normAutofit/>
           </a:bodyPr>
+          <a:lstStyle/>
           <a:p>
             <a:endParaRPr lang="pt-BR" sz="2800" b="0" strike="noStrike" spc="-1">
               <a:solidFill>
@@ -1476,6 +1508,7 @@
           <a:bodyPr lIns="0" tIns="0" rIns="0" bIns="0">
             <a:normAutofit/>
           </a:bodyPr>
+          <a:lstStyle/>
           <a:p>
             <a:endParaRPr lang="pt-BR" sz="2800" b="0" strike="noStrike" spc="-1">
               <a:solidFill>
@@ -1509,6 +1542,7 @@
           <a:bodyPr lIns="0" tIns="0" rIns="0" bIns="0">
             <a:normAutofit/>
           </a:bodyPr>
+          <a:lstStyle/>
           <a:p>
             <a:endParaRPr lang="pt-BR" sz="2800" b="0" strike="noStrike" spc="-1">
               <a:solidFill>
@@ -1565,6 +1599,7 @@
         </p:spPr>
         <p:txBody>
           <a:bodyPr lIns="0" tIns="0" rIns="0" bIns="0" anchor="ctr"/>
+          <a:lstStyle/>
           <a:p>
             <a:endParaRPr lang="pt-BR" sz="1800" b="0" strike="noStrike" spc="-1">
               <a:solidFill>
@@ -1598,6 +1633,7 @@
           <a:bodyPr lIns="0" tIns="0" rIns="0" bIns="0">
             <a:normAutofit/>
           </a:bodyPr>
+          <a:lstStyle/>
           <a:p>
             <a:endParaRPr lang="pt-BR" sz="2800" b="0" strike="noStrike" spc="-1">
               <a:solidFill>
@@ -1631,6 +1667,7 @@
           <a:bodyPr lIns="0" tIns="0" rIns="0" bIns="0">
             <a:normAutofit/>
           </a:bodyPr>
+          <a:lstStyle/>
           <a:p>
             <a:endParaRPr lang="pt-BR" sz="2800" b="0" strike="noStrike" spc="-1">
               <a:solidFill>
@@ -1664,6 +1701,7 @@
           <a:bodyPr lIns="0" tIns="0" rIns="0" bIns="0">
             <a:normAutofit/>
           </a:bodyPr>
+          <a:lstStyle/>
           <a:p>
             <a:endParaRPr lang="pt-BR" sz="2800" b="0" strike="noStrike" spc="-1">
               <a:solidFill>
@@ -1720,6 +1758,7 @@
         </p:spPr>
         <p:txBody>
           <a:bodyPr lIns="0" tIns="0" rIns="0" bIns="0" anchor="ctr"/>
+          <a:lstStyle/>
           <a:p>
             <a:endParaRPr lang="pt-BR" sz="1800" b="0" strike="noStrike" spc="-1">
               <a:solidFill>
@@ -1753,6 +1792,7 @@
           <a:bodyPr lIns="0" tIns="0" rIns="0" bIns="0">
             <a:normAutofit/>
           </a:bodyPr>
+          <a:lstStyle/>
           <a:p>
             <a:endParaRPr lang="pt-BR" sz="2800" b="0" strike="noStrike" spc="-1">
               <a:solidFill>
@@ -1786,6 +1826,7 @@
           <a:bodyPr lIns="0" tIns="0" rIns="0" bIns="0">
             <a:normAutofit/>
           </a:bodyPr>
+          <a:lstStyle/>
           <a:p>
             <a:endParaRPr lang="pt-BR" sz="2800" b="0" strike="noStrike" spc="-1">
               <a:solidFill>
@@ -1842,6 +1883,7 @@
         </p:spPr>
         <p:txBody>
           <a:bodyPr lIns="0" tIns="0" rIns="0" bIns="0" anchor="ctr"/>
+          <a:lstStyle/>
           <a:p>
             <a:endParaRPr lang="pt-BR" sz="1800" b="0" strike="noStrike" spc="-1">
               <a:solidFill>
@@ -1875,6 +1917,7 @@
           <a:bodyPr lIns="0" tIns="0" rIns="0" bIns="0">
             <a:normAutofit/>
           </a:bodyPr>
+          <a:lstStyle/>
           <a:p>
             <a:endParaRPr lang="pt-BR" sz="2800" b="0" strike="noStrike" spc="-1">
               <a:solidFill>
@@ -1908,6 +1951,7 @@
           <a:bodyPr lIns="0" tIns="0" rIns="0" bIns="0">
             <a:normAutofit/>
           </a:bodyPr>
+          <a:lstStyle/>
           <a:p>
             <a:endParaRPr lang="pt-BR" sz="2800" b="0" strike="noStrike" spc="-1">
               <a:solidFill>
@@ -1941,6 +1985,7 @@
           <a:bodyPr lIns="0" tIns="0" rIns="0" bIns="0">
             <a:normAutofit/>
           </a:bodyPr>
+          <a:lstStyle/>
           <a:p>
             <a:endParaRPr lang="pt-BR" sz="2800" b="0" strike="noStrike" spc="-1">
               <a:solidFill>
@@ -1974,6 +2019,7 @@
           <a:bodyPr lIns="0" tIns="0" rIns="0" bIns="0">
             <a:normAutofit/>
           </a:bodyPr>
+          <a:lstStyle/>
           <a:p>
             <a:endParaRPr lang="pt-BR" sz="2800" b="0" strike="noStrike" spc="-1">
               <a:solidFill>
@@ -2030,6 +2076,7 @@
         </p:spPr>
         <p:txBody>
           <a:bodyPr lIns="0" tIns="0" rIns="0" bIns="0" anchor="ctr"/>
+          <a:lstStyle/>
           <a:p>
             <a:endParaRPr lang="pt-BR" sz="1800" b="0" strike="noStrike" spc="-1">
               <a:solidFill>
@@ -2063,6 +2110,7 @@
           <a:bodyPr lIns="0" tIns="0" rIns="0" bIns="0">
             <a:normAutofit/>
           </a:bodyPr>
+          <a:lstStyle/>
           <a:p>
             <a:endParaRPr lang="pt-BR" sz="2800" b="0" strike="noStrike" spc="-1">
               <a:solidFill>
@@ -2096,6 +2144,7 @@
           <a:bodyPr lIns="0" tIns="0" rIns="0" bIns="0">
             <a:normAutofit/>
           </a:bodyPr>
+          <a:lstStyle/>
           <a:p>
             <a:endParaRPr lang="pt-BR" sz="2800" b="0" strike="noStrike" spc="-1">
               <a:solidFill>
@@ -2129,6 +2178,7 @@
           <a:bodyPr lIns="0" tIns="0" rIns="0" bIns="0">
             <a:normAutofit/>
           </a:bodyPr>
+          <a:lstStyle/>
           <a:p>
             <a:endParaRPr lang="pt-BR" sz="2800" b="0" strike="noStrike" spc="-1">
               <a:solidFill>
@@ -2162,6 +2212,7 @@
           <a:bodyPr lIns="0" tIns="0" rIns="0" bIns="0">
             <a:normAutofit/>
           </a:bodyPr>
+          <a:lstStyle/>
           <a:p>
             <a:endParaRPr lang="pt-BR" sz="2800" b="0" strike="noStrike" spc="-1">
               <a:solidFill>
@@ -2195,6 +2246,7 @@
           <a:bodyPr lIns="0" tIns="0" rIns="0" bIns="0">
             <a:normAutofit/>
           </a:bodyPr>
+          <a:lstStyle/>
           <a:p>
             <a:endParaRPr lang="pt-BR" sz="2800" b="0" strike="noStrike" spc="-1">
               <a:solidFill>
@@ -2228,6 +2280,7 @@
           <a:bodyPr lIns="0" tIns="0" rIns="0" bIns="0">
             <a:normAutofit/>
           </a:bodyPr>
+          <a:lstStyle/>
           <a:p>
             <a:endParaRPr lang="pt-BR" sz="2800" b="0" strike="noStrike" spc="-1">
               <a:solidFill>
@@ -2284,6 +2337,7 @@
         </p:spPr>
         <p:txBody>
           <a:bodyPr lIns="0" tIns="0" rIns="0" bIns="0" anchor="ctr"/>
+          <a:lstStyle/>
           <a:p>
             <a:endParaRPr lang="pt-BR" sz="1800" b="0" strike="noStrike" spc="-1">
               <a:solidFill>
@@ -2317,6 +2371,7 @@
           <a:bodyPr lIns="0" tIns="0" rIns="0" bIns="0">
             <a:normAutofit/>
           </a:bodyPr>
+          <a:lstStyle/>
           <a:p>
             <a:endParaRPr lang="pt-BR" sz="2800" b="0" strike="noStrike" spc="-1">
               <a:solidFill>
@@ -2373,6 +2428,7 @@
         </p:spPr>
         <p:txBody>
           <a:bodyPr lIns="0" tIns="0" rIns="0" bIns="0" anchor="ctr"/>
+          <a:lstStyle/>
           <a:p>
             <a:endParaRPr lang="pt-BR" sz="1800" b="0" strike="noStrike" spc="-1">
               <a:solidFill>
@@ -2406,6 +2462,7 @@
           <a:bodyPr lIns="0" tIns="0" rIns="0" bIns="0">
             <a:normAutofit/>
           </a:bodyPr>
+          <a:lstStyle/>
           <a:p>
             <a:endParaRPr lang="pt-BR" sz="2800" b="0" strike="noStrike" spc="-1">
               <a:solidFill>
@@ -2439,6 +2496,7 @@
           <a:bodyPr lIns="0" tIns="0" rIns="0" bIns="0">
             <a:normAutofit/>
           </a:bodyPr>
+          <a:lstStyle/>
           <a:p>
             <a:endParaRPr lang="pt-BR" sz="2800" b="0" strike="noStrike" spc="-1">
               <a:solidFill>
@@ -2495,6 +2553,7 @@
         </p:spPr>
         <p:txBody>
           <a:bodyPr lIns="0" tIns="0" rIns="0" bIns="0" anchor="ctr"/>
+          <a:lstStyle/>
           <a:p>
             <a:endParaRPr lang="pt-BR" sz="1800" b="0" strike="noStrike" spc="-1">
               <a:solidFill>
@@ -2551,6 +2610,7 @@
         </p:spPr>
         <p:txBody>
           <a:bodyPr lIns="0" tIns="0" rIns="0" bIns="0" anchor="ctr"/>
+          <a:lstStyle/>
           <a:p>
             <a:pPr algn="ctr"/>
             <a:endParaRPr lang="pt-BR" sz="3200" b="0" strike="noStrike" spc="-1">
@@ -2605,6 +2665,7 @@
         </p:spPr>
         <p:txBody>
           <a:bodyPr lIns="0" tIns="0" rIns="0" bIns="0" anchor="ctr"/>
+          <a:lstStyle/>
           <a:p>
             <a:endParaRPr lang="pt-BR" sz="1800" b="0" strike="noStrike" spc="-1">
               <a:solidFill>
@@ -2638,6 +2699,7 @@
           <a:bodyPr lIns="0" tIns="0" rIns="0" bIns="0">
             <a:normAutofit/>
           </a:bodyPr>
+          <a:lstStyle/>
           <a:p>
             <a:endParaRPr lang="pt-BR" sz="2800" b="0" strike="noStrike" spc="-1">
               <a:solidFill>
@@ -2671,6 +2733,7 @@
           <a:bodyPr lIns="0" tIns="0" rIns="0" bIns="0">
             <a:normAutofit/>
           </a:bodyPr>
+          <a:lstStyle/>
           <a:p>
             <a:endParaRPr lang="pt-BR" sz="2800" b="0" strike="noStrike" spc="-1">
               <a:solidFill>
@@ -2704,6 +2767,7 @@
           <a:bodyPr lIns="0" tIns="0" rIns="0" bIns="0">
             <a:normAutofit/>
           </a:bodyPr>
+          <a:lstStyle/>
           <a:p>
             <a:endParaRPr lang="pt-BR" sz="2800" b="0" strike="noStrike" spc="-1">
               <a:solidFill>
@@ -2760,6 +2824,7 @@
         </p:spPr>
         <p:txBody>
           <a:bodyPr lIns="0" tIns="0" rIns="0" bIns="0" anchor="ctr"/>
+          <a:lstStyle/>
           <a:p>
             <a:endParaRPr lang="pt-BR" sz="1800" b="0" strike="noStrike" spc="-1">
               <a:solidFill>
@@ -2793,6 +2858,7 @@
           <a:bodyPr lIns="0" tIns="0" rIns="0" bIns="0">
             <a:normAutofit/>
           </a:bodyPr>
+          <a:lstStyle/>
           <a:p>
             <a:endParaRPr lang="pt-BR" sz="2800" b="0" strike="noStrike" spc="-1">
               <a:solidFill>
@@ -2826,6 +2892,7 @@
           <a:bodyPr lIns="0" tIns="0" rIns="0" bIns="0">
             <a:normAutofit/>
           </a:bodyPr>
+          <a:lstStyle/>
           <a:p>
             <a:endParaRPr lang="pt-BR" sz="2800" b="0" strike="noStrike" spc="-1">
               <a:solidFill>
@@ -2859,6 +2926,7 @@
           <a:bodyPr lIns="0" tIns="0" rIns="0" bIns="0">
             <a:normAutofit/>
           </a:bodyPr>
+          <a:lstStyle/>
           <a:p>
             <a:endParaRPr lang="pt-BR" sz="2800" b="0" strike="noStrike" spc="-1">
               <a:solidFill>
@@ -2915,6 +2983,7 @@
         </p:spPr>
         <p:txBody>
           <a:bodyPr lIns="0" tIns="0" rIns="0" bIns="0" anchor="ctr"/>
+          <a:lstStyle/>
           <a:p>
             <a:endParaRPr lang="pt-BR" sz="1800" b="0" strike="noStrike" spc="-1">
               <a:solidFill>
@@ -2948,6 +3017,7 @@
           <a:bodyPr lIns="0" tIns="0" rIns="0" bIns="0">
             <a:normAutofit/>
           </a:bodyPr>
+          <a:lstStyle/>
           <a:p>
             <a:endParaRPr lang="pt-BR" sz="2800" b="0" strike="noStrike" spc="-1">
               <a:solidFill>
@@ -2981,6 +3051,7 @@
           <a:bodyPr lIns="0" tIns="0" rIns="0" bIns="0">
             <a:normAutofit/>
           </a:bodyPr>
+          <a:lstStyle/>
           <a:p>
             <a:endParaRPr lang="pt-BR" sz="2800" b="0" strike="noStrike" spc="-1">
               <a:solidFill>
@@ -3014,6 +3085,7 @@
           <a:bodyPr lIns="0" tIns="0" rIns="0" bIns="0">
             <a:normAutofit/>
           </a:bodyPr>
+          <a:lstStyle/>
           <a:p>
             <a:endParaRPr lang="pt-BR" sz="2800" b="0" strike="noStrike" spc="-1">
               <a:solidFill>
@@ -3059,7 +3131,7 @@
       </p:grpSpPr>
       <p:sp>
         <p:nvSpPr>
-          <p:cNvPr id="0" name="PlaceHolder 1"/>
+          <p:cNvPr id="6" name="PlaceHolder 1"/>
           <p:cNvSpPr>
             <a:spLocks noGrp="1"/>
           </p:cNvSpPr>
@@ -3078,6 +3150,7 @@
         </p:spPr>
         <p:txBody>
           <a:bodyPr anchor="b"/>
+          <a:lstStyle/>
           <a:p>
             <a:pPr algn="ctr">
               <a:lnSpc>
@@ -3123,6 +3196,7 @@
         </p:spPr>
         <p:txBody>
           <a:bodyPr anchor="ctr"/>
+          <a:lstStyle/>
           <a:p>
             <a:endParaRPr lang="pt-BR" sz="2400" b="0" strike="noStrike" spc="-1">
               <a:latin typeface="Times New Roman" panose="02020603050405020304"/>
@@ -3151,6 +3225,7 @@
         </p:spPr>
         <p:txBody>
           <a:bodyPr anchor="ctr"/>
+          <a:lstStyle/>
           <a:p>
             <a:endParaRPr lang="pt-BR" sz="2400" b="0" strike="noStrike" spc="-1">
               <a:latin typeface="Times New Roman" panose="02020603050405020304"/>
@@ -3179,6 +3254,7 @@
         </p:spPr>
         <p:txBody>
           <a:bodyPr anchor="ctr"/>
+          <a:lstStyle/>
           <a:p>
             <a:endParaRPr lang="pt-BR" sz="2400" b="0" strike="noStrike" spc="-1">
               <a:latin typeface="Times New Roman" panose="02020603050405020304"/>
@@ -3209,6 +3285,7 @@
           <a:bodyPr lIns="0" tIns="0" rIns="0" bIns="0">
             <a:normAutofit/>
           </a:bodyPr>
+          <a:lstStyle/>
           <a:p>
             <a:pPr marL="431800" indent="-323850">
               <a:spcBef>
@@ -3230,12 +3307,6 @@
               </a:rPr>
               <a:t>Clique para editar o formato do texto da estrutura de tópicos</a:t>
             </a:r>
-            <a:endParaRPr lang="pt-BR" sz="2800" b="0" strike="noStrike" spc="-1">
-              <a:solidFill>
-                <a:srgbClr val="000000"/>
-              </a:solidFill>
-              <a:latin typeface="Calibri"/>
-            </a:endParaRPr>
           </a:p>
           <a:p>
             <a:pPr marL="864235" lvl="1" indent="-323850">
@@ -3258,12 +3329,6 @@
               </a:rPr>
               <a:t>2.º nível da estrutura de tópicos</a:t>
             </a:r>
-            <a:endParaRPr lang="pt-BR" sz="2000" b="0" strike="noStrike" spc="-1">
-              <a:solidFill>
-                <a:srgbClr val="000000"/>
-              </a:solidFill>
-              <a:latin typeface="Calibri"/>
-            </a:endParaRPr>
           </a:p>
           <a:p>
             <a:pPr marL="1296035" lvl="2" indent="-288290">
@@ -3286,12 +3351,6 @@
               </a:rPr>
               <a:t>3.º nível da estrutura de tópicos</a:t>
             </a:r>
-            <a:endParaRPr lang="pt-BR" sz="1800" b="0" strike="noStrike" spc="-1">
-              <a:solidFill>
-                <a:srgbClr val="000000"/>
-              </a:solidFill>
-              <a:latin typeface="Calibri"/>
-            </a:endParaRPr>
           </a:p>
           <a:p>
             <a:pPr marL="1727835" lvl="3" indent="-215900">
@@ -3314,12 +3373,6 @@
               </a:rPr>
               <a:t>4.º nível da estrutura de tópicos</a:t>
             </a:r>
-            <a:endParaRPr lang="pt-BR" sz="1800" b="0" strike="noStrike" spc="-1">
-              <a:solidFill>
-                <a:srgbClr val="000000"/>
-              </a:solidFill>
-              <a:latin typeface="Calibri"/>
-            </a:endParaRPr>
           </a:p>
           <a:p>
             <a:pPr marL="2160270" lvl="4" indent="-215900">
@@ -3342,12 +3395,6 @@
               </a:rPr>
               <a:t>5.º nível da estrutura de tópicos</a:t>
             </a:r>
-            <a:endParaRPr lang="pt-BR" sz="2000" b="0" strike="noStrike" spc="-1">
-              <a:solidFill>
-                <a:srgbClr val="000000"/>
-              </a:solidFill>
-              <a:latin typeface="Calibri"/>
-            </a:endParaRPr>
           </a:p>
           <a:p>
             <a:pPr marL="2592070" lvl="5" indent="-215900">
@@ -3370,12 +3417,6 @@
               </a:rPr>
               <a:t>6.º nível da estrutura de tópicos</a:t>
             </a:r>
-            <a:endParaRPr lang="pt-BR" sz="2000" b="0" strike="noStrike" spc="-1">
-              <a:solidFill>
-                <a:srgbClr val="000000"/>
-              </a:solidFill>
-              <a:latin typeface="Calibri"/>
-            </a:endParaRPr>
           </a:p>
           <a:p>
             <a:pPr marL="3023870" lvl="6" indent="-215900">
@@ -3398,12 +3439,6 @@
               </a:rPr>
               <a:t>7.º nível da estrutura de tópicos</a:t>
             </a:r>
-            <a:endParaRPr lang="pt-BR" sz="2000" b="0" strike="noStrike" spc="-1">
-              <a:solidFill>
-                <a:srgbClr val="000000"/>
-              </a:solidFill>
-              <a:latin typeface="Calibri"/>
-            </a:endParaRPr>
           </a:p>
         </p:txBody>
       </p:sp>
@@ -3478,6 +3513,7 @@
         </p:spPr>
         <p:txBody>
           <a:bodyPr anchor="b"/>
+          <a:lstStyle/>
           <a:p>
             <a:pPr algn="ctr">
               <a:lnSpc>
@@ -3523,6 +3559,7 @@
         </p:spPr>
         <p:txBody>
           <a:bodyPr anchor="ctr"/>
+          <a:lstStyle/>
           <a:p>
             <a:endParaRPr lang="pt-BR" sz="2400" b="0" strike="noStrike" spc="-1">
               <a:latin typeface="Times New Roman" panose="02020603050405020304"/>
@@ -3551,6 +3588,7 @@
         </p:spPr>
         <p:txBody>
           <a:bodyPr anchor="ctr"/>
+          <a:lstStyle/>
           <a:p>
             <a:endParaRPr lang="pt-BR" sz="2400" b="0" strike="noStrike" spc="-1">
               <a:latin typeface="Times New Roman" panose="02020603050405020304"/>
@@ -3579,6 +3617,7 @@
         </p:spPr>
         <p:txBody>
           <a:bodyPr anchor="ctr"/>
+          <a:lstStyle/>
           <a:p>
             <a:endParaRPr lang="pt-BR" sz="2400" b="0" strike="noStrike" spc="-1">
               <a:latin typeface="Times New Roman" panose="02020603050405020304"/>
@@ -3609,6 +3648,7 @@
           <a:bodyPr lIns="0" tIns="0" rIns="0" bIns="0">
             <a:normAutofit/>
           </a:bodyPr>
+          <a:lstStyle/>
           <a:p>
             <a:pPr marL="431800" indent="-323850">
               <a:spcBef>
@@ -3630,12 +3670,6 @@
               </a:rPr>
               <a:t>Clique para editar o formato do texto da estrutura de tópicos</a:t>
             </a:r>
-            <a:endParaRPr lang="pt-BR" sz="2800" b="0" strike="noStrike" spc="-1">
-              <a:solidFill>
-                <a:srgbClr val="000000"/>
-              </a:solidFill>
-              <a:latin typeface="Calibri"/>
-            </a:endParaRPr>
           </a:p>
           <a:p>
             <a:pPr marL="864235" lvl="1" indent="-323850">
@@ -3658,12 +3692,6 @@
               </a:rPr>
               <a:t>2.º nível da estrutura de tópicos</a:t>
             </a:r>
-            <a:endParaRPr lang="pt-BR" sz="2000" b="0" strike="noStrike" spc="-1">
-              <a:solidFill>
-                <a:srgbClr val="000000"/>
-              </a:solidFill>
-              <a:latin typeface="Calibri"/>
-            </a:endParaRPr>
           </a:p>
           <a:p>
             <a:pPr marL="1296035" lvl="2" indent="-288290">
@@ -3686,12 +3714,6 @@
               </a:rPr>
               <a:t>3.º nível da estrutura de tópicos</a:t>
             </a:r>
-            <a:endParaRPr lang="pt-BR" sz="1800" b="0" strike="noStrike" spc="-1">
-              <a:solidFill>
-                <a:srgbClr val="000000"/>
-              </a:solidFill>
-              <a:latin typeface="Calibri"/>
-            </a:endParaRPr>
           </a:p>
           <a:p>
             <a:pPr marL="1727835" lvl="3" indent="-215900">
@@ -3714,12 +3736,6 @@
               </a:rPr>
               <a:t>4.º nível da estrutura de tópicos</a:t>
             </a:r>
-            <a:endParaRPr lang="pt-BR" sz="1800" b="0" strike="noStrike" spc="-1">
-              <a:solidFill>
-                <a:srgbClr val="000000"/>
-              </a:solidFill>
-              <a:latin typeface="Calibri"/>
-            </a:endParaRPr>
           </a:p>
           <a:p>
             <a:pPr marL="2160270" lvl="4" indent="-215900">
@@ -3742,12 +3758,6 @@
               </a:rPr>
               <a:t>5.º nível da estrutura de tópicos</a:t>
             </a:r>
-            <a:endParaRPr lang="pt-BR" sz="2000" b="0" strike="noStrike" spc="-1">
-              <a:solidFill>
-                <a:srgbClr val="000000"/>
-              </a:solidFill>
-              <a:latin typeface="Calibri"/>
-            </a:endParaRPr>
           </a:p>
           <a:p>
             <a:pPr marL="2592070" lvl="5" indent="-215900">
@@ -3770,12 +3780,6 @@
               </a:rPr>
               <a:t>6.º nível da estrutura de tópicos</a:t>
             </a:r>
-            <a:endParaRPr lang="pt-BR" sz="2000" b="0" strike="noStrike" spc="-1">
-              <a:solidFill>
-                <a:srgbClr val="000000"/>
-              </a:solidFill>
-              <a:latin typeface="Calibri"/>
-            </a:endParaRPr>
           </a:p>
           <a:p>
             <a:pPr marL="3023870" lvl="6" indent="-215900">
@@ -3798,12 +3802,6 @@
               </a:rPr>
               <a:t>7.º nível da estrutura de tópicos</a:t>
             </a:r>
-            <a:endParaRPr lang="pt-BR" sz="2000" b="0" strike="noStrike" spc="-1">
-              <a:solidFill>
-                <a:srgbClr val="000000"/>
-              </a:solidFill>
-              <a:latin typeface="Calibri"/>
-            </a:endParaRPr>
           </a:p>
         </p:txBody>
       </p:sp>
@@ -3864,7 +3862,7 @@
           <p:nvPr/>
         </p:nvPicPr>
         <p:blipFill>
-          <a:blip r:embed="rId1"/>
+          <a:blip r:embed="rId2"/>
           <a:stretch>
             <a:fillRect/>
           </a:stretch>
@@ -3943,6 +3941,7 @@
           <a:bodyPr anchor="b">
             <a:normAutofit/>
           </a:bodyPr>
+          <a:lstStyle/>
           <a:p>
             <a:pPr algn="ctr">
               <a:lnSpc>
@@ -4008,13 +4007,6 @@
   <p:clrMapOvr>
     <a:masterClrMapping/>
   </p:clrMapOvr>
-  <p:timing>
-    <p:tnLst>
-      <p:par>
-        <p:cTn id="1" dur="indefinite" restart="never" nodeType="tmRoot"/>
-      </p:par>
-    </p:tnLst>
-  </p:timing>
 </p:sld>
 </file>
 
@@ -4086,7 +4078,7 @@
           <p:nvPr/>
         </p:nvPicPr>
         <p:blipFill>
-          <a:blip r:embed="rId1"/>
+          <a:blip r:embed="rId2"/>
           <a:stretch>
             <a:fillRect/>
           </a:stretch>
@@ -4111,7 +4103,7 @@
           <p:nvPr/>
         </p:nvPicPr>
         <p:blipFill>
-          <a:blip r:embed="rId1"/>
+          <a:blip r:embed="rId2"/>
           <a:stretch>
             <a:fillRect/>
           </a:stretch>
@@ -4136,7 +4128,7 @@
           <p:nvPr/>
         </p:nvPicPr>
         <p:blipFill>
-          <a:blip r:embed="rId1"/>
+          <a:blip r:embed="rId2"/>
           <a:srcRect r="88435"/>
           <a:stretch>
             <a:fillRect/>
@@ -4188,6 +4180,7 @@
         </p:style>
         <p:txBody>
           <a:bodyPr wrap="none" lIns="90000" tIns="45000" rIns="90000" bIns="45000"/>
+          <a:lstStyle/>
           <a:p>
             <a:pPr>
               <a:lnSpc>
@@ -4243,6 +4236,7 @@
         </p:style>
         <p:txBody>
           <a:bodyPr wrap="none" lIns="90000" tIns="45000" rIns="90000" bIns="45000"/>
+          <a:lstStyle/>
           <a:p>
             <a:pPr>
               <a:lnSpc>
@@ -4348,6 +4342,7 @@
         </p:style>
         <p:txBody>
           <a:bodyPr wrap="none" lIns="90000" tIns="45000" rIns="90000" bIns="45000"/>
+          <a:lstStyle/>
           <a:p>
             <a:pPr>
               <a:lnSpc>
@@ -4443,6 +4438,7 @@
         </p:style>
         <p:txBody>
           <a:bodyPr wrap="none" lIns="90000" tIns="45000" rIns="90000" bIns="45000"/>
+          <a:lstStyle/>
           <a:p>
             <a:pPr>
               <a:lnSpc>
@@ -4538,6 +4534,7 @@
         </p:style>
         <p:txBody>
           <a:bodyPr wrap="none" lIns="90000" tIns="45000" rIns="90000" bIns="45000"/>
+          <a:lstStyle/>
           <a:p>
             <a:pPr>
               <a:lnSpc>
@@ -4643,6 +4640,7 @@
         </p:style>
         <p:txBody>
           <a:bodyPr wrap="none" lIns="90000" tIns="45000" rIns="90000" bIns="45000"/>
+          <a:lstStyle/>
           <a:p>
             <a:pPr>
               <a:lnSpc>
@@ -4738,6 +4736,7 @@
         </p:style>
         <p:txBody>
           <a:bodyPr wrap="none" lIns="90000" tIns="45000" rIns="90000" bIns="45000"/>
+          <a:lstStyle/>
           <a:p>
             <a:pPr>
               <a:lnSpc>
@@ -4805,13 +4804,6 @@
   <p:clrMapOvr>
     <a:masterClrMapping/>
   </p:clrMapOvr>
-  <p:timing>
-    <p:tnLst>
-      <p:par>
-        <p:cTn id="1" dur="indefinite" restart="never" nodeType="tmRoot"/>
-      </p:par>
-    </p:tnLst>
-  </p:timing>
 </p:sld>
 </file>
 
@@ -4847,7 +4839,7 @@
           <p:nvPr/>
         </p:nvPicPr>
         <p:blipFill>
-          <a:blip r:embed="rId1"/>
+          <a:blip r:embed="rId2"/>
           <a:stretch>
             <a:fillRect/>
           </a:stretch>
@@ -4872,7 +4864,7 @@
           <p:nvPr/>
         </p:nvPicPr>
         <p:blipFill>
-          <a:blip r:embed="rId1"/>
+          <a:blip r:embed="rId2"/>
           <a:stretch>
             <a:fillRect/>
           </a:stretch>
@@ -4897,7 +4889,7 @@
           <p:nvPr/>
         </p:nvPicPr>
         <p:blipFill>
-          <a:blip r:embed="rId1"/>
+          <a:blip r:embed="rId2"/>
           <a:srcRect r="88435"/>
           <a:stretch>
             <a:fillRect/>
@@ -4949,6 +4941,7 @@
         </p:style>
         <p:txBody>
           <a:bodyPr wrap="none" lIns="90000" tIns="45000" rIns="90000" bIns="45000"/>
+          <a:lstStyle/>
           <a:p>
             <a:pPr>
               <a:lnSpc>
@@ -5004,6 +4997,7 @@
         </p:style>
         <p:txBody>
           <a:bodyPr lIns="90000" tIns="45000" rIns="90000" bIns="45000"/>
+          <a:lstStyle/>
           <a:p>
             <a:pPr marL="342900" indent="-342900">
               <a:lnSpc>
@@ -5147,13 +5141,6 @@
   <p:clrMapOvr>
     <a:masterClrMapping/>
   </p:clrMapOvr>
-  <p:timing>
-    <p:tnLst>
-      <p:par>
-        <p:cTn id="1" dur="indefinite" restart="never" nodeType="tmRoot"/>
-      </p:par>
-    </p:tnLst>
-  </p:timing>
 </p:sld>
 </file>
 
@@ -5189,7 +5176,7 @@
           <p:nvPr/>
         </p:nvPicPr>
         <p:blipFill>
-          <a:blip r:embed="rId1"/>
+          <a:blip r:embed="rId2"/>
           <a:stretch>
             <a:fillRect/>
           </a:stretch>
@@ -5214,7 +5201,7 @@
           <p:nvPr/>
         </p:nvPicPr>
         <p:blipFill>
-          <a:blip r:embed="rId1"/>
+          <a:blip r:embed="rId2"/>
           <a:stretch>
             <a:fillRect/>
           </a:stretch>
@@ -5239,7 +5226,7 @@
           <p:nvPr/>
         </p:nvPicPr>
         <p:blipFill>
-          <a:blip r:embed="rId1"/>
+          <a:blip r:embed="rId2"/>
           <a:srcRect r="88435"/>
           <a:stretch>
             <a:fillRect/>
@@ -5291,6 +5278,7 @@
         </p:style>
         <p:txBody>
           <a:bodyPr wrap="none" lIns="90000" tIns="45000" rIns="90000" bIns="45000"/>
+          <a:lstStyle/>
           <a:p>
             <a:pPr>
               <a:lnSpc>
@@ -5358,7 +5346,7 @@
           <p:nvPr/>
         </p:nvPicPr>
         <p:blipFill>
-          <a:blip r:embed="rId2"/>
+          <a:blip r:embed="rId3"/>
           <a:stretch>
             <a:fillRect/>
           </a:stretch>
@@ -5381,13 +5369,6 @@
   <p:clrMapOvr>
     <a:masterClrMapping/>
   </p:clrMapOvr>
-  <p:timing>
-    <p:tnLst>
-      <p:par>
-        <p:cTn id="1" dur="indefinite" restart="never" nodeType="tmRoot"/>
-      </p:par>
-    </p:tnLst>
-  </p:timing>
 </p:sld>
 </file>
 
@@ -5459,7 +5440,7 @@
           <p:nvPr/>
         </p:nvPicPr>
         <p:blipFill>
-          <a:blip r:embed="rId1"/>
+          <a:blip r:embed="rId2"/>
           <a:stretch>
             <a:fillRect/>
           </a:stretch>
@@ -5484,7 +5465,7 @@
           <p:nvPr/>
         </p:nvPicPr>
         <p:blipFill>
-          <a:blip r:embed="rId1"/>
+          <a:blip r:embed="rId2"/>
           <a:stretch>
             <a:fillRect/>
           </a:stretch>
@@ -5509,7 +5490,7 @@
           <p:nvPr/>
         </p:nvPicPr>
         <p:blipFill>
-          <a:blip r:embed="rId1"/>
+          <a:blip r:embed="rId2"/>
           <a:srcRect r="88435"/>
           <a:stretch>
             <a:fillRect/>
@@ -5561,6 +5542,7 @@
         </p:style>
         <p:txBody>
           <a:bodyPr wrap="none" lIns="90000" tIns="45000" rIns="90000" bIns="45000"/>
+          <a:lstStyle/>
           <a:p>
             <a:pPr>
               <a:lnSpc>
@@ -5616,6 +5598,7 @@
         </p:style>
         <p:txBody>
           <a:bodyPr lIns="90000" tIns="45000" rIns="90000" bIns="45000"/>
+          <a:lstStyle/>
           <a:p>
             <a:pPr marL="342900" indent="-342900">
               <a:lnSpc>
@@ -5793,13 +5776,6 @@
   <p:clrMapOvr>
     <a:masterClrMapping/>
   </p:clrMapOvr>
-  <p:timing>
-    <p:tnLst>
-      <p:par>
-        <p:cTn id="1" dur="indefinite" restart="never" nodeType="tmRoot"/>
-      </p:par>
-    </p:tnLst>
-  </p:timing>
 </p:sld>
 </file>
 
@@ -5871,7 +5847,7 @@
           <p:nvPr/>
         </p:nvPicPr>
         <p:blipFill>
-          <a:blip r:embed="rId1"/>
+          <a:blip r:embed="rId2"/>
           <a:stretch>
             <a:fillRect/>
           </a:stretch>
@@ -5896,7 +5872,7 @@
           <p:nvPr/>
         </p:nvPicPr>
         <p:blipFill>
-          <a:blip r:embed="rId1"/>
+          <a:blip r:embed="rId2"/>
           <a:stretch>
             <a:fillRect/>
           </a:stretch>
@@ -5921,7 +5897,7 @@
           <p:nvPr/>
         </p:nvPicPr>
         <p:blipFill>
-          <a:blip r:embed="rId1"/>
+          <a:blip r:embed="rId2"/>
           <a:srcRect r="88435"/>
           <a:stretch>
             <a:fillRect/>
@@ -5973,6 +5949,7 @@
         </p:style>
         <p:txBody>
           <a:bodyPr wrap="none" lIns="90000" tIns="45000" rIns="90000" bIns="45000"/>
+          <a:lstStyle/>
           <a:p>
             <a:pPr>
               <a:lnSpc>
@@ -5995,44 +5972,6 @@
           </a:p>
         </p:txBody>
       </p:sp>
-      <p:sp>
-        <p:nvSpPr>
-          <p:cNvPr id="119" name="CustomShape 3"/>
-          <p:cNvSpPr/>
-          <p:nvPr/>
-        </p:nvSpPr>
-        <p:spPr>
-          <a:xfrm>
-            <a:off x="0" y="4896000"/>
-            <a:ext cx="12191760" cy="1961640"/>
-          </a:xfrm>
-          <a:prstGeom prst="rect">
-            <a:avLst/>
-          </a:prstGeom>
-          <a:solidFill>
-            <a:srgbClr val="333C3C">
-              <a:alpha val="62000"/>
-            </a:srgbClr>
-          </a:solidFill>
-          <a:ln>
-            <a:noFill/>
-          </a:ln>
-        </p:spPr>
-        <p:style>
-          <a:lnRef idx="2">
-            <a:schemeClr val="accent1">
-              <a:shade val="50000"/>
-            </a:schemeClr>
-          </a:lnRef>
-          <a:fillRef idx="1">
-            <a:schemeClr val="accent1"/>
-          </a:fillRef>
-          <a:effectRef idx="0">
-            <a:schemeClr val="accent1"/>
-          </a:effectRef>
-          <a:fontRef idx="minor"/>
-        </p:style>
-      </p:sp>
       <p:pic>
         <p:nvPicPr>
           <p:cNvPr id="2" name="Picture 1" descr="Desenho_Solucao"/>
@@ -6042,7 +5981,7 @@
           <p:nvPr/>
         </p:nvPicPr>
         <p:blipFill>
-          <a:blip r:embed="rId2"/>
+          <a:blip r:embed="rId3"/>
           <a:stretch>
             <a:fillRect/>
           </a:stretch>
@@ -6062,13 +6001,6 @@
   <p:clrMapOvr>
     <a:masterClrMapping/>
   </p:clrMapOvr>
-  <p:timing>
-    <p:tnLst>
-      <p:par>
-        <p:cTn id="1" dur="indefinite" restart="never" nodeType="tmRoot"/>
-      </p:par>
-    </p:tnLst>
-  </p:timing>
 </p:sld>
 </file>
 
@@ -6140,7 +6072,7 @@
           <p:nvPr/>
         </p:nvPicPr>
         <p:blipFill>
-          <a:blip r:embed="rId1"/>
+          <a:blip r:embed="rId2"/>
           <a:stretch>
             <a:fillRect/>
           </a:stretch>
@@ -6165,7 +6097,7 @@
           <p:nvPr/>
         </p:nvPicPr>
         <p:blipFill>
-          <a:blip r:embed="rId1"/>
+          <a:blip r:embed="rId2"/>
           <a:stretch>
             <a:fillRect/>
           </a:stretch>
@@ -6190,7 +6122,7 @@
           <p:nvPr/>
         </p:nvPicPr>
         <p:blipFill>
-          <a:blip r:embed="rId1"/>
+          <a:blip r:embed="rId2"/>
           <a:srcRect r="88435"/>
           <a:stretch>
             <a:fillRect/>
@@ -6242,6 +6174,7 @@
         </p:style>
         <p:txBody>
           <a:bodyPr wrap="none" lIns="90000" tIns="45000" rIns="90000" bIns="45000"/>
+          <a:lstStyle/>
           <a:p>
             <a:pPr>
               <a:lnSpc>
@@ -6335,6 +6268,7 @@
         </p:style>
         <p:txBody>
           <a:bodyPr lIns="90000" tIns="45000" rIns="90000" bIns="45000"/>
+          <a:lstStyle/>
           <a:p>
             <a:pPr>
               <a:lnSpc>
@@ -6383,7 +6317,7 @@
           <p:nvPr/>
         </p:nvPicPr>
         <p:blipFill>
-          <a:blip r:embed="rId2"/>
+          <a:blip r:embed="rId3"/>
           <a:srcRect b="3985"/>
           <a:stretch>
             <a:fillRect/>
@@ -6407,13 +6341,6 @@
   <p:clrMapOvr>
     <a:masterClrMapping/>
   </p:clrMapOvr>
-  <p:timing>
-    <p:tnLst>
-      <p:par>
-        <p:cTn id="1" dur="indefinite" restart="never" nodeType="tmRoot"/>
-      </p:par>
-    </p:tnLst>
-  </p:timing>
 </p:sld>
 </file>
 
@@ -6485,7 +6412,7 @@
           <p:nvPr/>
         </p:nvPicPr>
         <p:blipFill>
-          <a:blip r:embed="rId1"/>
+          <a:blip r:embed="rId2"/>
           <a:stretch>
             <a:fillRect/>
           </a:stretch>
@@ -6510,7 +6437,7 @@
           <p:nvPr/>
         </p:nvPicPr>
         <p:blipFill>
-          <a:blip r:embed="rId1"/>
+          <a:blip r:embed="rId2"/>
           <a:stretch>
             <a:fillRect/>
           </a:stretch>
@@ -6535,7 +6462,7 @@
           <p:nvPr/>
         </p:nvPicPr>
         <p:blipFill>
-          <a:blip r:embed="rId1"/>
+          <a:blip r:embed="rId2"/>
           <a:srcRect r="88435"/>
           <a:stretch>
             <a:fillRect/>
@@ -6587,6 +6514,7 @@
         </p:style>
         <p:txBody>
           <a:bodyPr wrap="none" lIns="90000" tIns="45000" rIns="90000" bIns="45000"/>
+          <a:lstStyle/>
           <a:p>
             <a:pPr>
               <a:lnSpc>
@@ -6611,44 +6539,6 @@
       </p:sp>
       <p:sp>
         <p:nvSpPr>
-          <p:cNvPr id="134" name="CustomShape 3"/>
-          <p:cNvSpPr/>
-          <p:nvPr/>
-        </p:nvSpPr>
-        <p:spPr>
-          <a:xfrm>
-            <a:off x="0" y="4896000"/>
-            <a:ext cx="12191760" cy="1961640"/>
-          </a:xfrm>
-          <a:prstGeom prst="rect">
-            <a:avLst/>
-          </a:prstGeom>
-          <a:solidFill>
-            <a:srgbClr val="333C3C">
-              <a:alpha val="62000"/>
-            </a:srgbClr>
-          </a:solidFill>
-          <a:ln>
-            <a:noFill/>
-          </a:ln>
-        </p:spPr>
-        <p:style>
-          <a:lnRef idx="2">
-            <a:schemeClr val="accent1">
-              <a:shade val="50000"/>
-            </a:schemeClr>
-          </a:lnRef>
-          <a:fillRef idx="1">
-            <a:schemeClr val="accent1"/>
-          </a:fillRef>
-          <a:effectRef idx="0">
-            <a:schemeClr val="accent1"/>
-          </a:effectRef>
-          <a:fontRef idx="minor"/>
-        </p:style>
-      </p:sp>
-      <p:sp>
-        <p:nvSpPr>
           <p:cNvPr id="135" name="CustomShape 4"/>
           <p:cNvSpPr/>
           <p:nvPr/>
@@ -6680,6 +6570,7 @@
         </p:style>
         <p:txBody>
           <a:bodyPr lIns="90000" tIns="45000" rIns="90000" bIns="45000"/>
+          <a:lstStyle/>
           <a:p>
             <a:pPr marL="342900" indent="-342900">
               <a:lnSpc>
@@ -6825,13 +6716,6 @@
   <p:clrMapOvr>
     <a:masterClrMapping/>
   </p:clrMapOvr>
-  <p:timing>
-    <p:tnLst>
-      <p:par>
-        <p:cTn id="1" dur="indefinite" restart="never" nodeType="tmRoot"/>
-      </p:par>
-    </p:tnLst>
-  </p:timing>
 </p:sld>
 </file>
 
@@ -7055,6 +6939,8 @@
       </a:bgFillStyleLst>
     </a:fmtScheme>
   </a:themeElements>
+  <a:objectDefaults/>
+  <a:extraClrSchemeLst/>
   <a:extLst>
     <a:ext uri="{05A4C25C-085E-4340-85A3-A5531E510DB2}">
       <thm15:themeFamily xmlns:thm15="http://schemas.microsoft.com/office/thememl/2012/main" name="Office Theme" id="{62F939B6-93AF-4DB8-9C6B-D6C7DFDC589F}" vid="{4A3C46E8-61CC-4603-A589-7422A47A8E4A}"/>
@@ -7283,6 +7169,8 @@
       </a:bgFillStyleLst>
     </a:fmtScheme>
   </a:themeElements>
+  <a:objectDefaults/>
+  <a:extraClrSchemeLst/>
   <a:extLst>
     <a:ext uri="{05A4C25C-085E-4340-85A3-A5531E510DB2}">
       <thm15:themeFamily xmlns:thm15="http://schemas.microsoft.com/office/thememl/2012/main" name="Office Theme" id="{62F939B6-93AF-4DB8-9C6B-D6C7DFDC589F}" vid="{4A3C46E8-61CC-4603-A589-7422A47A8E4A}"/>

</xml_diff>

<commit_message>
Mudandças BPMN e no PPT
</commit_message>
<xml_diff>
--- a/Sprint1/Apresentacoes/PI_Contexto.pptx
+++ b/Sprint1/Apresentacoes/PI_Contexto.pptx
@@ -109,6 +109,11 @@
       </a:defRPr>
     </a:lvl9pPr>
   </p:defaultTextStyle>
+  <p:extLst>
+    <p:ext uri="{EFAFB233-063F-42B5-8137-9DF3F51BA10A}">
+      <p15:sldGuideLst xmlns:p15="http://schemas.microsoft.com/office/powerpoint/2012/main"/>
+    </p:ext>
+  </p:extLst>
 </p:presentation>
 </file>
 
@@ -6235,105 +6240,40 @@
           <a:fontRef idx="minor"/>
         </p:style>
       </p:sp>
-      <p:sp>
-        <p:nvSpPr>
-          <p:cNvPr id="127" name="CustomShape 4"/>
-          <p:cNvSpPr/>
-          <p:nvPr/>
-        </p:nvSpPr>
-        <p:spPr>
-          <a:xfrm>
-            <a:off x="1112040" y="1569600"/>
-            <a:ext cx="10024200" cy="1187640"/>
-          </a:xfrm>
-          <a:prstGeom prst="rect">
-            <a:avLst/>
-          </a:prstGeom>
-          <a:noFill/>
-          <a:ln>
-            <a:noFill/>
-          </a:ln>
-        </p:spPr>
-        <p:style>
-          <a:lnRef idx="0">
-            <a:srgbClr val="FFFFFF"/>
-          </a:lnRef>
-          <a:fillRef idx="0">
-            <a:srgbClr val="FFFFFF"/>
-          </a:fillRef>
-          <a:effectRef idx="0">
-            <a:srgbClr val="FFFFFF"/>
-          </a:effectRef>
-          <a:fontRef idx="minor"/>
-        </p:style>
-        <p:txBody>
-          <a:bodyPr lIns="90000" tIns="45000" rIns="90000" bIns="45000"/>
-          <a:lstStyle/>
-          <a:p>
-            <a:pPr>
-              <a:lnSpc>
-                <a:spcPct val="100000"/>
-              </a:lnSpc>
-            </a:pPr>
-            <a:r>
-              <a:rPr lang="pt-BR" sz="2400" b="0" strike="noStrike" spc="-1">
-                <a:solidFill>
-                  <a:srgbClr val="000000"/>
-                </a:solidFill>
-                <a:latin typeface="Lato" panose="020F0602020204030203"/>
-              </a:rPr>
-              <a:t>Aqui vai o BPMN OU HLD;</a:t>
-            </a:r>
-            <a:endParaRPr lang="pt-BR" sz="2400" b="0" strike="noStrike" spc="-1">
-              <a:latin typeface="Arial" panose="020B0604020202020204"/>
-            </a:endParaRPr>
-          </a:p>
-          <a:p>
-            <a:pPr>
-              <a:lnSpc>
-                <a:spcPct val="100000"/>
-              </a:lnSpc>
-            </a:pPr>
-            <a:endParaRPr lang="pt-BR" sz="2400" b="0" strike="noStrike" spc="-1">
-              <a:latin typeface="Arial" panose="020B0604020202020204"/>
-            </a:endParaRPr>
-          </a:p>
-          <a:p>
-            <a:pPr>
-              <a:lnSpc>
-                <a:spcPct val="100000"/>
-              </a:lnSpc>
-            </a:pPr>
-            <a:endParaRPr lang="pt-BR" sz="2400" b="0" strike="noStrike" spc="-1">
-              <a:latin typeface="Arial" panose="020B0604020202020204"/>
-            </a:endParaRPr>
-          </a:p>
-        </p:txBody>
-      </p:sp>
       <p:pic>
         <p:nvPicPr>
-          <p:cNvPr id="128" name="Imagem 2"/>
-          <p:cNvPicPr/>
+          <p:cNvPr id="3" name="Imagem 2" descr="Mapa com linhas pretas em fundo branco&#10;&#10;Descrição gerada automaticamente">
+            <a:extLst>
+              <a:ext uri="{FF2B5EF4-FFF2-40B4-BE49-F238E27FC236}">
+                <a16:creationId xmlns:a16="http://schemas.microsoft.com/office/drawing/2014/main" id="{64BAC94A-77D8-4D3F-8E22-5E1B48A866E2}"/>
+              </a:ext>
+            </a:extLst>
+          </p:cNvPr>
+          <p:cNvPicPr>
+            <a:picLocks noChangeAspect="1"/>
+          </p:cNvPicPr>
           <p:nvPr/>
         </p:nvPicPr>
         <p:blipFill>
-          <a:blip r:embed="rId3"/>
-          <a:srcRect b="3985"/>
+          <a:blip r:embed="rId3">
+            <a:extLst>
+              <a:ext uri="{28A0092B-C50C-407E-A947-70E740481C1C}">
+                <a14:useLocalDpi xmlns:a14="http://schemas.microsoft.com/office/drawing/2010/main" val="0"/>
+              </a:ext>
+            </a:extLst>
+          </a:blip>
           <a:stretch>
             <a:fillRect/>
           </a:stretch>
         </p:blipFill>
         <p:spPr>
           <a:xfrm>
-            <a:off x="1112040" y="1448280"/>
-            <a:ext cx="10068840" cy="4856400"/>
-          </a:xfrm>
-          <a:prstGeom prst="rect">
-            <a:avLst/>
-          </a:prstGeom>
-          <a:ln>
-            <a:noFill/>
-          </a:ln>
+            <a:off x="1060855" y="1447560"/>
+            <a:ext cx="10069330" cy="5058481"/>
+          </a:xfrm>
+          <a:prstGeom prst="rect">
+            <a:avLst/>
+          </a:prstGeom>
         </p:spPr>
       </p:pic>
     </p:spTree>

</xml_diff>